<commit_message>
Add black background to R code areas
</commit_message>
<xml_diff>
--- a/presentation.pptx
+++ b/presentation.pptx
@@ -3784,6 +3784,9 @@
             <a:off x="838200" y="1825625"/>
             <a:ext cx="5181600" cy="4459036"/>
           </a:xfrm>
+          <a:solidFill>
+            <a:schemeClr val="tx1"/>
+          </a:solidFill>
         </p:spPr>
         <p:txBody>
           <a:bodyPr>
@@ -5431,7 +5434,11 @@
             <p:ph sz="half" idx="1"/>
           </p:nvPr>
         </p:nvSpPr>
-        <p:spPr/>
+        <p:spPr>
+          <a:solidFill>
+            <a:schemeClr val="tx1"/>
+          </a:solidFill>
+        </p:spPr>
         <p:txBody>
           <a:bodyPr>
             <a:normAutofit/>
@@ -7710,7 +7717,11 @@
             <p:ph sz="half" idx="1"/>
           </p:nvPr>
         </p:nvSpPr>
-        <p:spPr/>
+        <p:spPr>
+          <a:solidFill>
+            <a:schemeClr val="tx1"/>
+          </a:solidFill>
+        </p:spPr>
         <p:txBody>
           <a:bodyPr>
             <a:normAutofit/>
@@ -8585,7 +8596,11 @@
             <p:ph sz="half" idx="1"/>
           </p:nvPr>
         </p:nvSpPr>
-        <p:spPr/>
+        <p:spPr>
+          <a:solidFill>
+            <a:schemeClr val="tx1"/>
+          </a:solidFill>
+        </p:spPr>
         <p:txBody>
           <a:bodyPr>
             <a:normAutofit/>
@@ -9525,7 +9540,11 @@
             <p:ph sz="half" idx="1"/>
           </p:nvPr>
         </p:nvSpPr>
-        <p:spPr/>
+        <p:spPr>
+          <a:solidFill>
+            <a:schemeClr val="tx1"/>
+          </a:solidFill>
+        </p:spPr>
         <p:txBody>
           <a:bodyPr>
             <a:noAutofit/>
@@ -10095,7 +10114,11 @@
             <p:ph sz="half" idx="1"/>
           </p:nvPr>
         </p:nvSpPr>
-        <p:spPr/>
+        <p:spPr>
+          <a:solidFill>
+            <a:schemeClr val="tx1"/>
+          </a:solidFill>
+        </p:spPr>
         <p:txBody>
           <a:bodyPr>
             <a:noAutofit/>
@@ -10624,7 +10647,11 @@
             <p:ph sz="half" idx="1"/>
           </p:nvPr>
         </p:nvSpPr>
-        <p:spPr/>
+        <p:spPr>
+          <a:solidFill>
+            <a:schemeClr val="tx1"/>
+          </a:solidFill>
+        </p:spPr>
         <p:txBody>
           <a:bodyPr>
             <a:noAutofit/>
@@ -12437,7 +12464,11 @@
             <p:ph sz="half" idx="1"/>
           </p:nvPr>
         </p:nvSpPr>
-        <p:spPr/>
+        <p:spPr>
+          <a:solidFill>
+            <a:schemeClr val="tx1"/>
+          </a:solidFill>
+        </p:spPr>
         <p:txBody>
           <a:bodyPr>
             <a:noAutofit/>
@@ -15979,6 +16010,9 @@
             <a:off x="838200" y="1825625"/>
             <a:ext cx="5181600" cy="4398878"/>
           </a:xfrm>
+          <a:solidFill>
+            <a:schemeClr val="tx1"/>
+          </a:solidFill>
         </p:spPr>
         <p:txBody>
           <a:bodyPr>
@@ -19854,6 +19888,9 @@
             <a:off x="6172200" y="2065867"/>
             <a:ext cx="5181600" cy="4111096"/>
           </a:xfrm>
+          <a:solidFill>
+            <a:schemeClr val="tx1"/>
+          </a:solidFill>
         </p:spPr>
         <p:txBody>
           <a:bodyPr>
@@ -20366,7 +20403,9 @@
             <p:ph sz="half" idx="1"/>
           </p:nvPr>
         </p:nvSpPr>
-        <p:spPr/>
+        <p:spPr>
+          <a:noFill/>
+        </p:spPr>
         <p:txBody>
           <a:bodyPr>
             <a:normAutofit/>
@@ -20412,6 +20451,9 @@
                   <a:srgbClr val="D4BE98"/>
                 </a:solidFill>
                 <a:effectLst/>
+                <a:highlight>
+                  <a:srgbClr val="000000"/>
+                </a:highlight>
                 <a:latin typeface="FiraCode Nerd Font" panose="020B0809050000020004" pitchFamily="49" charset="0"/>
               </a:rPr>
               <a:t>r2.mcar </a:t>
@@ -20422,6 +20464,9 @@
                   <a:srgbClr val="E78A4E"/>
                 </a:solidFill>
                 <a:effectLst/>
+                <a:highlight>
+                  <a:srgbClr val="000000"/>
+                </a:highlight>
                 <a:latin typeface="FiraCode Nerd Font" panose="020B0809050000020004" pitchFamily="49" charset="0"/>
               </a:rPr>
               <a:t>&lt;-</a:t>
@@ -20432,6 +20477,9 @@
                   <a:srgbClr val="D4BE98"/>
                 </a:solidFill>
                 <a:effectLst/>
+                <a:highlight>
+                  <a:srgbClr val="000000"/>
+                </a:highlight>
                 <a:latin typeface="FiraCode Nerd Font" panose="020B0809050000020004" pitchFamily="49" charset="0"/>
               </a:rPr>
               <a:t> </a:t>
@@ -20442,6 +20490,9 @@
                   <a:srgbClr val="D3869B"/>
                 </a:solidFill>
                 <a:effectLst/>
+                <a:highlight>
+                  <a:srgbClr val="000000"/>
+                </a:highlight>
                 <a:latin typeface="FiraCode Nerd Font" panose="020B0809050000020004" pitchFamily="49" charset="0"/>
               </a:rPr>
               <a:t>1</a:t>
@@ -20452,6 +20503,9 @@
                   <a:srgbClr val="D4BE98"/>
                 </a:solidFill>
                 <a:effectLst/>
+                <a:highlight>
+                  <a:srgbClr val="000000"/>
+                </a:highlight>
                 <a:latin typeface="FiraCode Nerd Font" panose="020B0809050000020004" pitchFamily="49" charset="0"/>
               </a:rPr>
               <a:t> </a:t>
@@ -20462,6 +20516,9 @@
                   <a:srgbClr val="E78A4E"/>
                 </a:solidFill>
                 <a:effectLst/>
+                <a:highlight>
+                  <a:srgbClr val="000000"/>
+                </a:highlight>
                 <a:latin typeface="FiraCode Nerd Font" panose="020B0809050000020004" pitchFamily="49" charset="0"/>
               </a:rPr>
               <a:t>-</a:t>
@@ -20472,6 +20529,9 @@
                   <a:srgbClr val="D4BE98"/>
                 </a:solidFill>
                 <a:effectLst/>
+                <a:highlight>
+                  <a:srgbClr val="000000"/>
+                </a:highlight>
                 <a:latin typeface="FiraCode Nerd Font" panose="020B0809050000020004" pitchFamily="49" charset="0"/>
               </a:rPr>
               <a:t> </a:t>
@@ -20482,6 +20542,9 @@
                   <a:srgbClr val="A9B665"/>
                 </a:solidFill>
                 <a:effectLst/>
+                <a:highlight>
+                  <a:srgbClr val="000000"/>
+                </a:highlight>
                 <a:latin typeface="FiraCode Nerd Font" panose="020B0809050000020004" pitchFamily="49" charset="0"/>
               </a:rPr>
               <a:t>rbinom</a:t>
@@ -20492,6 +20555,9 @@
                   <a:srgbClr val="D4BE98"/>
                 </a:solidFill>
                 <a:effectLst/>
+                <a:highlight>
+                  <a:srgbClr val="000000"/>
+                </a:highlight>
                 <a:latin typeface="FiraCode Nerd Font" panose="020B0809050000020004" pitchFamily="49" charset="0"/>
               </a:rPr>
               <a:t>(n, </a:t>
@@ -20502,6 +20568,9 @@
                   <a:srgbClr val="D3869B"/>
                 </a:solidFill>
                 <a:effectLst/>
+                <a:highlight>
+                  <a:srgbClr val="000000"/>
+                </a:highlight>
                 <a:latin typeface="FiraCode Nerd Font" panose="020B0809050000020004" pitchFamily="49" charset="0"/>
               </a:rPr>
               <a:t>1</a:t>
@@ -20512,6 +20581,9 @@
                   <a:srgbClr val="D4BE98"/>
                 </a:solidFill>
                 <a:effectLst/>
+                <a:highlight>
+                  <a:srgbClr val="000000"/>
+                </a:highlight>
                 <a:latin typeface="FiraCode Nerd Font" panose="020B0809050000020004" pitchFamily="49" charset="0"/>
               </a:rPr>
               <a:t>, </a:t>
@@ -20522,6 +20594,9 @@
                   <a:srgbClr val="D3869B"/>
                 </a:solidFill>
                 <a:effectLst/>
+                <a:highlight>
+                  <a:srgbClr val="000000"/>
+                </a:highlight>
                 <a:latin typeface="FiraCode Nerd Font" panose="020B0809050000020004" pitchFamily="49" charset="0"/>
               </a:rPr>
               <a:t>0.5</a:t>
@@ -20532,6 +20607,9 @@
                   <a:srgbClr val="D4BE98"/>
                 </a:solidFill>
                 <a:effectLst/>
+                <a:highlight>
+                  <a:srgbClr val="000000"/>
+                </a:highlight>
                 <a:latin typeface="FiraCode Nerd Font" panose="020B0809050000020004" pitchFamily="49" charset="0"/>
               </a:rPr>
               <a:t>)</a:t>
@@ -20567,6 +20645,9 @@
                   <a:srgbClr val="D4BE98"/>
                 </a:solidFill>
                 <a:effectLst/>
+                <a:highlight>
+                  <a:srgbClr val="000000"/>
+                </a:highlight>
                 <a:latin typeface="FiraCode Nerd Font" panose="020B0809050000020004" pitchFamily="49" charset="0"/>
               </a:rPr>
               <a:t>r2.mar </a:t>
@@ -20577,6 +20658,9 @@
                   <a:srgbClr val="E78A4E"/>
                 </a:solidFill>
                 <a:effectLst/>
+                <a:highlight>
+                  <a:srgbClr val="000000"/>
+                </a:highlight>
                 <a:latin typeface="FiraCode Nerd Font" panose="020B0809050000020004" pitchFamily="49" charset="0"/>
               </a:rPr>
               <a:t>&lt;-</a:t>
@@ -20587,6 +20671,9 @@
                   <a:srgbClr val="D4BE98"/>
                 </a:solidFill>
                 <a:effectLst/>
+                <a:highlight>
+                  <a:srgbClr val="000000"/>
+                </a:highlight>
                 <a:latin typeface="FiraCode Nerd Font" panose="020B0809050000020004" pitchFamily="49" charset="0"/>
               </a:rPr>
               <a:t> </a:t>
@@ -20597,6 +20684,9 @@
                   <a:srgbClr val="D3869B"/>
                 </a:solidFill>
                 <a:effectLst/>
+                <a:highlight>
+                  <a:srgbClr val="000000"/>
+                </a:highlight>
                 <a:latin typeface="FiraCode Nerd Font" panose="020B0809050000020004" pitchFamily="49" charset="0"/>
               </a:rPr>
               <a:t>1</a:t>
@@ -20607,6 +20697,9 @@
                   <a:srgbClr val="D4BE98"/>
                 </a:solidFill>
                 <a:effectLst/>
+                <a:highlight>
+                  <a:srgbClr val="000000"/>
+                </a:highlight>
                 <a:latin typeface="FiraCode Nerd Font" panose="020B0809050000020004" pitchFamily="49" charset="0"/>
               </a:rPr>
               <a:t> </a:t>
@@ -20617,6 +20710,9 @@
                   <a:srgbClr val="E78A4E"/>
                 </a:solidFill>
                 <a:effectLst/>
+                <a:highlight>
+                  <a:srgbClr val="000000"/>
+                </a:highlight>
                 <a:latin typeface="FiraCode Nerd Font" panose="020B0809050000020004" pitchFamily="49" charset="0"/>
               </a:rPr>
               <a:t>-</a:t>
@@ -20627,6 +20723,9 @@
                   <a:srgbClr val="D4BE98"/>
                 </a:solidFill>
                 <a:effectLst/>
+                <a:highlight>
+                  <a:srgbClr val="000000"/>
+                </a:highlight>
                 <a:latin typeface="FiraCode Nerd Font" panose="020B0809050000020004" pitchFamily="49" charset="0"/>
               </a:rPr>
               <a:t> </a:t>
@@ -20637,6 +20736,9 @@
                   <a:srgbClr val="A9B665"/>
                 </a:solidFill>
                 <a:effectLst/>
+                <a:highlight>
+                  <a:srgbClr val="000000"/>
+                </a:highlight>
                 <a:latin typeface="FiraCode Nerd Font" panose="020B0809050000020004" pitchFamily="49" charset="0"/>
               </a:rPr>
               <a:t>rbinom</a:t>
@@ -20647,6 +20749,9 @@
                   <a:srgbClr val="D4BE98"/>
                 </a:solidFill>
                 <a:effectLst/>
+                <a:highlight>
+                  <a:srgbClr val="000000"/>
+                </a:highlight>
                 <a:latin typeface="FiraCode Nerd Font" panose="020B0809050000020004" pitchFamily="49" charset="0"/>
               </a:rPr>
               <a:t>(n, </a:t>
@@ -20657,6 +20762,9 @@
                   <a:srgbClr val="D3869B"/>
                 </a:solidFill>
                 <a:effectLst/>
+                <a:highlight>
+                  <a:srgbClr val="000000"/>
+                </a:highlight>
                 <a:latin typeface="FiraCode Nerd Font" panose="020B0809050000020004" pitchFamily="49" charset="0"/>
               </a:rPr>
               <a:t>1</a:t>
@@ -20667,6 +20775,9 @@
                   <a:srgbClr val="D4BE98"/>
                 </a:solidFill>
                 <a:effectLst/>
+                <a:highlight>
+                  <a:srgbClr val="000000"/>
+                </a:highlight>
                 <a:latin typeface="FiraCode Nerd Font" panose="020B0809050000020004" pitchFamily="49" charset="0"/>
               </a:rPr>
               <a:t>, </a:t>
@@ -20677,6 +20788,9 @@
                   <a:srgbClr val="A9B665"/>
                 </a:solidFill>
                 <a:effectLst/>
+                <a:highlight>
+                  <a:srgbClr val="000000"/>
+                </a:highlight>
                 <a:latin typeface="FiraCode Nerd Font" panose="020B0809050000020004" pitchFamily="49" charset="0"/>
               </a:rPr>
               <a:t>logistic</a:t>
@@ -20687,6 +20801,9 @@
                   <a:srgbClr val="D4BE98"/>
                 </a:solidFill>
                 <a:effectLst/>
+                <a:highlight>
+                  <a:srgbClr val="000000"/>
+                </a:highlight>
                 <a:latin typeface="FiraCode Nerd Font" panose="020B0809050000020004" pitchFamily="49" charset="0"/>
               </a:rPr>
               <a:t>(y[</a:t>
@@ -20697,6 +20814,9 @@
                   <a:srgbClr val="A9B665"/>
                 </a:solidFill>
                 <a:effectLst/>
+                <a:highlight>
+                  <a:srgbClr val="000000"/>
+                </a:highlight>
                 <a:latin typeface="FiraCode Nerd Font" panose="020B0809050000020004" pitchFamily="49" charset="0"/>
               </a:rPr>
               <a:t>, </a:t>
@@ -20707,6 +20827,9 @@
                   <a:srgbClr val="D3869B"/>
                 </a:solidFill>
                 <a:effectLst/>
+                <a:highlight>
+                  <a:srgbClr val="000000"/>
+                </a:highlight>
                 <a:latin typeface="FiraCode Nerd Font" panose="020B0809050000020004" pitchFamily="49" charset="0"/>
               </a:rPr>
               <a:t>1</a:t>
@@ -20717,6 +20840,9 @@
                   <a:srgbClr val="D4BE98"/>
                 </a:solidFill>
                 <a:effectLst/>
+                <a:highlight>
+                  <a:srgbClr val="000000"/>
+                </a:highlight>
                 <a:latin typeface="FiraCode Nerd Font" panose="020B0809050000020004" pitchFamily="49" charset="0"/>
               </a:rPr>
               <a:t>]))</a:t>
@@ -20752,6 +20878,9 @@
                   <a:srgbClr val="D4BE98"/>
                 </a:solidFill>
                 <a:effectLst/>
+                <a:highlight>
+                  <a:srgbClr val="000000"/>
+                </a:highlight>
                 <a:latin typeface="FiraCode Nerd Font" panose="020B0809050000020004" pitchFamily="49" charset="0"/>
               </a:rPr>
               <a:t>r2.mnar </a:t>
@@ -20762,6 +20891,9 @@
                   <a:srgbClr val="E78A4E"/>
                 </a:solidFill>
                 <a:effectLst/>
+                <a:highlight>
+                  <a:srgbClr val="000000"/>
+                </a:highlight>
                 <a:latin typeface="FiraCode Nerd Font" panose="020B0809050000020004" pitchFamily="49" charset="0"/>
               </a:rPr>
               <a:t>&lt;-</a:t>
@@ -20772,6 +20904,9 @@
                   <a:srgbClr val="D4BE98"/>
                 </a:solidFill>
                 <a:effectLst/>
+                <a:highlight>
+                  <a:srgbClr val="000000"/>
+                </a:highlight>
                 <a:latin typeface="FiraCode Nerd Font" panose="020B0809050000020004" pitchFamily="49" charset="0"/>
               </a:rPr>
               <a:t> </a:t>
@@ -20782,6 +20917,9 @@
                   <a:srgbClr val="D3869B"/>
                 </a:solidFill>
                 <a:effectLst/>
+                <a:highlight>
+                  <a:srgbClr val="000000"/>
+                </a:highlight>
                 <a:latin typeface="FiraCode Nerd Font" panose="020B0809050000020004" pitchFamily="49" charset="0"/>
               </a:rPr>
               <a:t>1</a:t>
@@ -20792,6 +20930,9 @@
                   <a:srgbClr val="D4BE98"/>
                 </a:solidFill>
                 <a:effectLst/>
+                <a:highlight>
+                  <a:srgbClr val="000000"/>
+                </a:highlight>
                 <a:latin typeface="FiraCode Nerd Font" panose="020B0809050000020004" pitchFamily="49" charset="0"/>
               </a:rPr>
               <a:t> </a:t>
@@ -20802,6 +20943,9 @@
                   <a:srgbClr val="E78A4E"/>
                 </a:solidFill>
                 <a:effectLst/>
+                <a:highlight>
+                  <a:srgbClr val="000000"/>
+                </a:highlight>
                 <a:latin typeface="FiraCode Nerd Font" panose="020B0809050000020004" pitchFamily="49" charset="0"/>
               </a:rPr>
               <a:t>-</a:t>
@@ -20812,6 +20956,9 @@
                   <a:srgbClr val="D4BE98"/>
                 </a:solidFill>
                 <a:effectLst/>
+                <a:highlight>
+                  <a:srgbClr val="000000"/>
+                </a:highlight>
                 <a:latin typeface="FiraCode Nerd Font" panose="020B0809050000020004" pitchFamily="49" charset="0"/>
               </a:rPr>
               <a:t> </a:t>
@@ -20821,6 +20968,9 @@
                 <a:solidFill>
                   <a:srgbClr val="A9B665"/>
                 </a:solidFill>
+                <a:highlight>
+                  <a:srgbClr val="000000"/>
+                </a:highlight>
                 <a:latin typeface="FiraCode Nerd Font" panose="020B0809050000020004" pitchFamily="49" charset="0"/>
               </a:rPr>
               <a:t>rbinom</a:t>
@@ -20831,6 +20981,9 @@
                   <a:srgbClr val="D4BE98"/>
                 </a:solidFill>
                 <a:effectLst/>
+                <a:highlight>
+                  <a:srgbClr val="000000"/>
+                </a:highlight>
                 <a:latin typeface="FiraCode Nerd Font" panose="020B0809050000020004" pitchFamily="49" charset="0"/>
               </a:rPr>
               <a:t>(n, </a:t>
@@ -20841,6 +20994,9 @@
                   <a:srgbClr val="D3869B"/>
                 </a:solidFill>
                 <a:effectLst/>
+                <a:highlight>
+                  <a:srgbClr val="000000"/>
+                </a:highlight>
                 <a:latin typeface="FiraCode Nerd Font" panose="020B0809050000020004" pitchFamily="49" charset="0"/>
               </a:rPr>
               <a:t>1</a:t>
@@ -20851,6 +21007,9 @@
                   <a:srgbClr val="D4BE98"/>
                 </a:solidFill>
                 <a:effectLst/>
+                <a:highlight>
+                  <a:srgbClr val="000000"/>
+                </a:highlight>
                 <a:latin typeface="FiraCode Nerd Font" panose="020B0809050000020004" pitchFamily="49" charset="0"/>
               </a:rPr>
               <a:t>, </a:t>
@@ -20861,6 +21020,9 @@
                   <a:srgbClr val="A9B665"/>
                 </a:solidFill>
                 <a:effectLst/>
+                <a:highlight>
+                  <a:srgbClr val="000000"/>
+                </a:highlight>
                 <a:latin typeface="FiraCode Nerd Font" panose="020B0809050000020004" pitchFamily="49" charset="0"/>
               </a:rPr>
               <a:t>logistic</a:t>
@@ -20871,6 +21033,9 @@
                   <a:srgbClr val="D4BE98"/>
                 </a:solidFill>
                 <a:effectLst/>
+                <a:highlight>
+                  <a:srgbClr val="000000"/>
+                </a:highlight>
                 <a:latin typeface="FiraCode Nerd Font" panose="020B0809050000020004" pitchFamily="49" charset="0"/>
               </a:rPr>
               <a:t>(y[</a:t>
@@ -20881,6 +21046,9 @@
                   <a:srgbClr val="A9B665"/>
                 </a:solidFill>
                 <a:effectLst/>
+                <a:highlight>
+                  <a:srgbClr val="000000"/>
+                </a:highlight>
                 <a:latin typeface="FiraCode Nerd Font" panose="020B0809050000020004" pitchFamily="49" charset="0"/>
               </a:rPr>
               <a:t>, </a:t>
@@ -20891,6 +21059,9 @@
                   <a:srgbClr val="D3869B"/>
                 </a:solidFill>
                 <a:effectLst/>
+                <a:highlight>
+                  <a:srgbClr val="000000"/>
+                </a:highlight>
                 <a:latin typeface="FiraCode Nerd Font" panose="020B0809050000020004" pitchFamily="49" charset="0"/>
               </a:rPr>
               <a:t>2</a:t>
@@ -20901,6 +21072,9 @@
                   <a:srgbClr val="D4BE98"/>
                 </a:solidFill>
                 <a:effectLst/>
+                <a:highlight>
+                  <a:srgbClr val="000000"/>
+                </a:highlight>
                 <a:latin typeface="FiraCode Nerd Font" panose="020B0809050000020004" pitchFamily="49" charset="0"/>
               </a:rPr>
               <a:t>]))</a:t>
@@ -20942,7 +21116,7 @@
         </p:blipFill>
         <p:spPr>
           <a:xfrm>
-            <a:off x="5656845" y="1920705"/>
+            <a:off x="6019800" y="1920705"/>
             <a:ext cx="5825649" cy="4161177"/>
           </a:xfrm>
           <a:prstGeom prst="rect">

</xml_diff>

<commit_message>
Correct next speaker's affiliation
</commit_message>
<xml_diff>
--- a/presentation.pptx
+++ b/presentation.pptx
@@ -19431,6 +19431,63 @@
           </a:prstGeom>
         </p:spPr>
       </p:pic>
+      <p:sp>
+        <p:nvSpPr>
+          <p:cNvPr id="3" name="Rectangle 2">
+            <a:extLst>
+              <a:ext uri="{FF2B5EF4-FFF2-40B4-BE49-F238E27FC236}">
+                <a16:creationId xmlns:a16="http://schemas.microsoft.com/office/drawing/2014/main" id="{C8115AE6-B6CD-CA4E-1A74-64317329ED55}"/>
+              </a:ext>
+            </a:extLst>
+          </p:cNvPr>
+          <p:cNvSpPr/>
+          <p:nvPr/>
+        </p:nvSpPr>
+        <p:spPr>
+          <a:xfrm>
+            <a:off x="4286865" y="3657601"/>
+            <a:ext cx="1356852" cy="629264"/>
+          </a:xfrm>
+          <a:prstGeom prst="rect">
+            <a:avLst/>
+          </a:prstGeom>
+          <a:solidFill>
+            <a:srgbClr val="B4181F"/>
+          </a:solidFill>
+          <a:ln>
+            <a:noFill/>
+          </a:ln>
+        </p:spPr>
+        <p:style>
+          <a:lnRef idx="2">
+            <a:schemeClr val="accent1">
+              <a:shade val="50000"/>
+            </a:schemeClr>
+          </a:lnRef>
+          <a:fillRef idx="1">
+            <a:schemeClr val="accent1"/>
+          </a:fillRef>
+          <a:effectRef idx="0">
+            <a:schemeClr val="accent1"/>
+          </a:effectRef>
+          <a:fontRef idx="minor">
+            <a:schemeClr val="lt1"/>
+          </a:fontRef>
+        </p:style>
+        <p:txBody>
+          <a:bodyPr rtlCol="0" anchor="ctr"/>
+          <a:lstStyle/>
+          <a:p>
+            <a:pPr algn="ctr"/>
+            <a:r>
+              <a:rPr lang="en-AU" sz="4000" dirty="0">
+                <a:latin typeface="+mj-lt"/>
+              </a:rPr>
+              <a:t>(FHI)</a:t>
+            </a:r>
+          </a:p>
+        </p:txBody>
+      </p:sp>
     </p:spTree>
     <p:extLst>
       <p:ext uri="{BB962C8B-B14F-4D97-AF65-F5344CB8AC3E}">

</xml_diff>